<commit_message>
exceptions/how: tweak python diagram
</commit_message>
<xml_diff>
--- a/diagrams/errorHandling/exceptions/how/example-python.pptx
+++ b/diagrams/errorHandling/exceptions/how/example-python.pptx
@@ -304,7 +304,7 @@
           <a:p>
             <a:fld id="{A4C9861C-6642-4704-ADEB-0FA002937DE4}" type="datetimeFigureOut">
               <a:rPr lang="en-SG" smtClean="0"/>
-              <a:t>11/2/2018</a:t>
+              <a:t>13/2/2018</a:t>
             </a:fld>
             <a:endParaRPr lang="en-SG"/>
           </a:p>
@@ -474,7 +474,7 @@
           <a:p>
             <a:fld id="{A4C9861C-6642-4704-ADEB-0FA002937DE4}" type="datetimeFigureOut">
               <a:rPr lang="en-SG" smtClean="0"/>
-              <a:t>11/2/2018</a:t>
+              <a:t>13/2/2018</a:t>
             </a:fld>
             <a:endParaRPr lang="en-SG"/>
           </a:p>
@@ -654,7 +654,7 @@
           <a:p>
             <a:fld id="{A4C9861C-6642-4704-ADEB-0FA002937DE4}" type="datetimeFigureOut">
               <a:rPr lang="en-SG" smtClean="0"/>
-              <a:t>11/2/2018</a:t>
+              <a:t>13/2/2018</a:t>
             </a:fld>
             <a:endParaRPr lang="en-SG"/>
           </a:p>
@@ -824,7 +824,7 @@
           <a:p>
             <a:fld id="{A4C9861C-6642-4704-ADEB-0FA002937DE4}" type="datetimeFigureOut">
               <a:rPr lang="en-SG" smtClean="0"/>
-              <a:t>11/2/2018</a:t>
+              <a:t>13/2/2018</a:t>
             </a:fld>
             <a:endParaRPr lang="en-SG"/>
           </a:p>
@@ -1070,7 +1070,7 @@
           <a:p>
             <a:fld id="{A4C9861C-6642-4704-ADEB-0FA002937DE4}" type="datetimeFigureOut">
               <a:rPr lang="en-SG" smtClean="0"/>
-              <a:t>11/2/2018</a:t>
+              <a:t>13/2/2018</a:t>
             </a:fld>
             <a:endParaRPr lang="en-SG"/>
           </a:p>
@@ -1358,7 +1358,7 @@
           <a:p>
             <a:fld id="{A4C9861C-6642-4704-ADEB-0FA002937DE4}" type="datetimeFigureOut">
               <a:rPr lang="en-SG" smtClean="0"/>
-              <a:t>11/2/2018</a:t>
+              <a:t>13/2/2018</a:t>
             </a:fld>
             <a:endParaRPr lang="en-SG"/>
           </a:p>
@@ -1780,7 +1780,7 @@
           <a:p>
             <a:fld id="{A4C9861C-6642-4704-ADEB-0FA002937DE4}" type="datetimeFigureOut">
               <a:rPr lang="en-SG" smtClean="0"/>
-              <a:t>11/2/2018</a:t>
+              <a:t>13/2/2018</a:t>
             </a:fld>
             <a:endParaRPr lang="en-SG"/>
           </a:p>
@@ -1898,7 +1898,7 @@
           <a:p>
             <a:fld id="{A4C9861C-6642-4704-ADEB-0FA002937DE4}" type="datetimeFigureOut">
               <a:rPr lang="en-SG" smtClean="0"/>
-              <a:t>11/2/2018</a:t>
+              <a:t>13/2/2018</a:t>
             </a:fld>
             <a:endParaRPr lang="en-SG"/>
           </a:p>
@@ -1993,7 +1993,7 @@
           <a:p>
             <a:fld id="{A4C9861C-6642-4704-ADEB-0FA002937DE4}" type="datetimeFigureOut">
               <a:rPr lang="en-SG" smtClean="0"/>
-              <a:t>11/2/2018</a:t>
+              <a:t>13/2/2018</a:t>
             </a:fld>
             <a:endParaRPr lang="en-SG"/>
           </a:p>
@@ -2270,7 +2270,7 @@
           <a:p>
             <a:fld id="{A4C9861C-6642-4704-ADEB-0FA002937DE4}" type="datetimeFigureOut">
               <a:rPr lang="en-SG" smtClean="0"/>
-              <a:t>11/2/2018</a:t>
+              <a:t>13/2/2018</a:t>
             </a:fld>
             <a:endParaRPr lang="en-SG"/>
           </a:p>
@@ -2523,7 +2523,7 @@
           <a:p>
             <a:fld id="{A4C9861C-6642-4704-ADEB-0FA002937DE4}" type="datetimeFigureOut">
               <a:rPr lang="en-SG" smtClean="0"/>
-              <a:t>11/2/2018</a:t>
+              <a:t>13/2/2018</a:t>
             </a:fld>
             <a:endParaRPr lang="en-SG"/>
           </a:p>
@@ -2736,7 +2736,7 @@
           <a:p>
             <a:fld id="{A4C9861C-6642-4704-ADEB-0FA002937DE4}" type="datetimeFigureOut">
               <a:rPr lang="en-SG" smtClean="0"/>
-              <a:t>11/2/2018</a:t>
+              <a:t>13/2/2018</a:t>
             </a:fld>
             <a:endParaRPr lang="en-SG"/>
           </a:p>
@@ -3119,8 +3119,8 @@
         </p:nvSpPr>
         <p:spPr>
           <a:xfrm>
-            <a:off x="971240" y="1875047"/>
-            <a:ext cx="3378754" cy="360040"/>
+            <a:off x="971240" y="1880336"/>
+            <a:ext cx="3378754" cy="294607"/>
           </a:xfrm>
           <a:prstGeom prst="roundRect">
             <a:avLst/>
@@ -3168,7 +3168,7 @@
         </p:nvSpPr>
         <p:spPr>
           <a:xfrm>
-            <a:off x="971240" y="4077072"/>
+            <a:off x="971240" y="4365104"/>
             <a:ext cx="3378753" cy="333210"/>
           </a:xfrm>
           <a:prstGeom prst="roundRect">
@@ -3217,7 +3217,7 @@
         </p:nvSpPr>
         <p:spPr>
           <a:xfrm>
-            <a:off x="971600" y="2996952"/>
+            <a:off x="971600" y="3284984"/>
             <a:ext cx="3384377" cy="563672"/>
           </a:xfrm>
           <a:prstGeom prst="roundRect">
@@ -3266,7 +3266,7 @@
         </p:nvSpPr>
         <p:spPr>
           <a:xfrm>
-            <a:off x="4932580" y="2564904"/>
+            <a:off x="4932580" y="2852936"/>
             <a:ext cx="3024336" cy="1008112"/>
           </a:xfrm>
           <a:prstGeom prst="borderCallout1">
@@ -3303,7 +3303,32 @@
             <a:pPr algn="ctr"/>
             <a:r>
               <a:rPr lang="en-US" dirty="0" smtClean="0"/>
-              <a:t>Code that might throw an exception is put inside a try block</a:t>
+              <a:t>Code that might throw an exception is put inside </a:t>
+            </a:r>
+            <a:r>
+              <a:rPr lang="en-US" dirty="0" smtClean="0"/>
+              <a:t/>
+            </a:r>
+            <a:br>
+              <a:rPr lang="en-US" dirty="0" smtClean="0"/>
+            </a:br>
+            <a:r>
+              <a:rPr lang="en-US" dirty="0" smtClean="0"/>
+              <a:t>a </a:t>
+            </a:r>
+            <a:r>
+              <a:rPr lang="en-US" sz="1600" b="1" dirty="0">
+                <a:latin typeface="Consolas" panose="020B0609020204030204" pitchFamily="49" charset="0"/>
+              </a:rPr>
+              <a:t>try</a:t>
+            </a:r>
+            <a:r>
+              <a:rPr lang="en-US" dirty="0" smtClean="0"/>
+              <a:t> </a:t>
+            </a:r>
+            <a:r>
+              <a:rPr lang="en-US" dirty="0" smtClean="0"/>
+              <a:t>clause</a:t>
             </a:r>
             <a:endParaRPr lang="en-SG" dirty="0"/>
           </a:p>
@@ -3317,7 +3342,7 @@
         </p:nvSpPr>
         <p:spPr>
           <a:xfrm>
-            <a:off x="4932580" y="3676667"/>
+            <a:off x="4932580" y="3964699"/>
             <a:ext cx="3018354" cy="616429"/>
           </a:xfrm>
           <a:prstGeom prst="borderCallout1">
@@ -3354,7 +3379,25 @@
             <a:pPr algn="ctr"/>
             <a:r>
               <a:rPr lang="en-US" dirty="0" smtClean="0"/>
-              <a:t>The catch block contains code to ‘handle’ the exception</a:t>
+              <a:t>The </a:t>
+            </a:r>
+            <a:r>
+              <a:rPr lang="en-US" sz="1600" b="1" dirty="0" smtClean="0">
+                <a:latin typeface="Consolas" panose="020B0609020204030204" pitchFamily="49" charset="0"/>
+              </a:rPr>
+              <a:t>except</a:t>
+            </a:r>
+            <a:r>
+              <a:rPr lang="en-US" sz="1600" dirty="0" smtClean="0"/>
+              <a:t> </a:t>
+            </a:r>
+            <a:r>
+              <a:rPr lang="en-US" dirty="0" smtClean="0"/>
+              <a:t>clause contains </a:t>
+            </a:r>
+            <a:r>
+              <a:rPr lang="en-US" dirty="0" smtClean="0"/>
+              <a:t>code to ‘handle’ the exception</a:t>
             </a:r>
             <a:endParaRPr lang="en-SG" dirty="0"/>
           </a:p>
@@ -3405,7 +3448,17 @@
             <a:pPr algn="ctr"/>
             <a:r>
               <a:rPr lang="en-US" dirty="0" smtClean="0"/>
-              <a:t>The problem is encapsulated in an Exception object and thrown out</a:t>
+              <a:t>The problem is encapsulated in an Exception object and </a:t>
+            </a:r>
+            <a:r>
+              <a:rPr lang="en-US" sz="1600" b="1" dirty="0">
+                <a:latin typeface="Consolas" panose="020B0609020204030204" pitchFamily="49" charset="0"/>
+              </a:rPr>
+              <a:t>raise</a:t>
+            </a:r>
+            <a:r>
+              <a:rPr lang="en-US" dirty="0" smtClean="0"/>
+              <a:t>d (i.e., thrown out)</a:t>
             </a:r>
             <a:endParaRPr lang="en-SG" dirty="0"/>
           </a:p>
@@ -3420,7 +3473,7 @@
         <p:spPr>
           <a:xfrm>
             <a:off x="467544" y="1277759"/>
-            <a:ext cx="3960440" cy="3139321"/>
+            <a:ext cx="3960440" cy="3416320"/>
           </a:xfrm>
           <a:prstGeom prst="rect">
             <a:avLst/>
@@ -3446,7 +3499,7 @@
               <a:t> </a:t>
             </a:r>
             <a:r>
-              <a:rPr lang="en-US" b="1" dirty="0" err="1">
+              <a:rPr lang="en-US" b="1" dirty="0" err="1" smtClean="0">
                 <a:solidFill>
                   <a:srgbClr val="C00000"/>
                 </a:solidFill>
@@ -3455,10 +3508,22 @@
               <a:t>process_array</a:t>
             </a:r>
             <a:r>
+              <a:rPr lang="en-US" dirty="0" smtClean="0">
+                <a:latin typeface="Consolas" panose="020B0609020204030204" pitchFamily="49" charset="0"/>
+              </a:rPr>
+              <a:t>(</a:t>
+            </a:r>
+            <a:r>
               <a:rPr lang="en-US" dirty="0">
                 <a:latin typeface="Consolas" panose="020B0609020204030204" pitchFamily="49" charset="0"/>
               </a:rPr>
-              <a:t>(inputs): </a:t>
+              <a:t>x</a:t>
+            </a:r>
+            <a:r>
+              <a:rPr lang="en-US" dirty="0" smtClean="0">
+                <a:latin typeface="Consolas" panose="020B0609020204030204" pitchFamily="49" charset="0"/>
+              </a:rPr>
+              <a:t>): </a:t>
             </a:r>
             <a:endParaRPr lang="en-US" dirty="0" smtClean="0">
               <a:latin typeface="Consolas" panose="020B0609020204030204" pitchFamily="49" charset="0"/>
@@ -3484,16 +3549,34 @@
               <a:t> </a:t>
             </a:r>
             <a:r>
-              <a:rPr lang="en-US" dirty="0" err="1">
+              <a:rPr lang="en-US" dirty="0" err="1" smtClean="0">
                 <a:latin typeface="Consolas" panose="020B0609020204030204" pitchFamily="49" charset="0"/>
               </a:rPr>
               <a:t>len</a:t>
             </a:r>
             <a:r>
+              <a:rPr lang="en-US" dirty="0" smtClean="0">
+                <a:latin typeface="Consolas" panose="020B0609020204030204" pitchFamily="49" charset="0"/>
+              </a:rPr>
+              <a:t>(</a:t>
+            </a:r>
+            <a:r>
               <a:rPr lang="en-US" dirty="0">
                 <a:latin typeface="Consolas" panose="020B0609020204030204" pitchFamily="49" charset="0"/>
               </a:rPr>
-              <a:t>(inputs) == 0: </a:t>
+              <a:t>x</a:t>
+            </a:r>
+            <a:r>
+              <a:rPr lang="en-US" dirty="0" smtClean="0">
+                <a:latin typeface="Consolas" panose="020B0609020204030204" pitchFamily="49" charset="0"/>
+              </a:rPr>
+              <a:t>) </a:t>
+            </a:r>
+            <a:r>
+              <a:rPr lang="en-US" dirty="0">
+                <a:latin typeface="Consolas" panose="020B0609020204030204" pitchFamily="49" charset="0"/>
+              </a:rPr>
+              <a:t>== 0: </a:t>
             </a:r>
             <a:endParaRPr lang="en-US" dirty="0" smtClean="0">
               <a:latin typeface="Consolas" panose="020B0609020204030204" pitchFamily="49" charset="0"/>
@@ -3530,6 +3613,22 @@
               </a:rPr>
               <a:t>()</a:t>
             </a:r>
+          </a:p>
+          <a:p>
+            <a:r>
+              <a:rPr lang="en-US" i="1" dirty="0" smtClean="0">
+                <a:solidFill>
+                  <a:schemeClr val="bg1">
+                    <a:lumMod val="50000"/>
+                  </a:schemeClr>
+                </a:solidFill>
+                <a:latin typeface="Consolas" panose="020B0609020204030204" pitchFamily="49" charset="0"/>
+              </a:rPr>
+              <a:t>  # process x</a:t>
+            </a:r>
+            <a:endParaRPr lang="en-US" dirty="0" smtClean="0">
+              <a:latin typeface="Consolas" panose="020B0609020204030204" pitchFamily="49" charset="0"/>
+            </a:endParaRPr>
           </a:p>
           <a:p>
             <a:endParaRPr lang="en-US" b="1" dirty="0">
@@ -3744,7 +3843,13 @@
               <a:rPr lang="en-US" dirty="0" smtClean="0">
                 <a:latin typeface="Consolas" panose="020B0609020204030204" pitchFamily="49" charset="0"/>
               </a:rPr>
-              <a:t>     print</a:t>
+              <a:t>   </a:t>
+            </a:r>
+            <a:r>
+              <a:rPr lang="en-US" dirty="0" smtClean="0">
+                <a:latin typeface="Consolas" panose="020B0609020204030204" pitchFamily="49" charset="0"/>
+              </a:rPr>
+              <a:t>print</a:t>
             </a:r>
             <a:r>
               <a:rPr lang="en-US" dirty="0">
@@ -3752,9 +3857,6 @@
               </a:rPr>
               <a:t>('Invalid inputs')</a:t>
             </a:r>
-            <a:endParaRPr lang="en-US" dirty="0">
-              <a:latin typeface="Consolas" panose="020B0609020204030204" pitchFamily="49" charset="0"/>
-            </a:endParaRPr>
           </a:p>
         </p:txBody>
       </p:sp>

</xml_diff>